<commit_message>
Ausarbeitung out of threshold in Week 1 ToDo pptx
</commit_message>
<xml_diff>
--- a/Report/Week 1 ToDo.pptx
+++ b/Report/Week 1 ToDo.pptx
@@ -261,7 +261,7 @@
           <a:p>
             <a:fld id="{8241CE7E-0F34-401D-A57E-323A74DBF7F2}" type="datetimeFigureOut">
               <a:rPr lang="en-US" smtClean="0"/>
-              <a:t>6/29/2022</a:t>
+              <a:t>6/30/2022</a:t>
             </a:fld>
             <a:endParaRPr lang="en-US"/>
           </a:p>
@@ -459,7 +459,7 @@
           <a:p>
             <a:fld id="{8241CE7E-0F34-401D-A57E-323A74DBF7F2}" type="datetimeFigureOut">
               <a:rPr lang="en-US" smtClean="0"/>
-              <a:t>6/29/2022</a:t>
+              <a:t>6/30/2022</a:t>
             </a:fld>
             <a:endParaRPr lang="en-US"/>
           </a:p>
@@ -667,7 +667,7 @@
           <a:p>
             <a:fld id="{8241CE7E-0F34-401D-A57E-323A74DBF7F2}" type="datetimeFigureOut">
               <a:rPr lang="en-US" smtClean="0"/>
-              <a:t>6/29/2022</a:t>
+              <a:t>6/30/2022</a:t>
             </a:fld>
             <a:endParaRPr lang="en-US"/>
           </a:p>
@@ -865,7 +865,7 @@
           <a:p>
             <a:fld id="{8241CE7E-0F34-401D-A57E-323A74DBF7F2}" type="datetimeFigureOut">
               <a:rPr lang="en-US" smtClean="0"/>
-              <a:t>6/29/2022</a:t>
+              <a:t>6/30/2022</a:t>
             </a:fld>
             <a:endParaRPr lang="en-US"/>
           </a:p>
@@ -1140,7 +1140,7 @@
           <a:p>
             <a:fld id="{8241CE7E-0F34-401D-A57E-323A74DBF7F2}" type="datetimeFigureOut">
               <a:rPr lang="en-US" smtClean="0"/>
-              <a:t>6/29/2022</a:t>
+              <a:t>6/30/2022</a:t>
             </a:fld>
             <a:endParaRPr lang="en-US"/>
           </a:p>
@@ -1405,7 +1405,7 @@
           <a:p>
             <a:fld id="{8241CE7E-0F34-401D-A57E-323A74DBF7F2}" type="datetimeFigureOut">
               <a:rPr lang="en-US" smtClean="0"/>
-              <a:t>6/29/2022</a:t>
+              <a:t>6/30/2022</a:t>
             </a:fld>
             <a:endParaRPr lang="en-US"/>
           </a:p>
@@ -1817,7 +1817,7 @@
           <a:p>
             <a:fld id="{8241CE7E-0F34-401D-A57E-323A74DBF7F2}" type="datetimeFigureOut">
               <a:rPr lang="en-US" smtClean="0"/>
-              <a:t>6/29/2022</a:t>
+              <a:t>6/30/2022</a:t>
             </a:fld>
             <a:endParaRPr lang="en-US"/>
           </a:p>
@@ -1958,7 +1958,7 @@
           <a:p>
             <a:fld id="{8241CE7E-0F34-401D-A57E-323A74DBF7F2}" type="datetimeFigureOut">
               <a:rPr lang="en-US" smtClean="0"/>
-              <a:t>6/29/2022</a:t>
+              <a:t>6/30/2022</a:t>
             </a:fld>
             <a:endParaRPr lang="en-US"/>
           </a:p>
@@ -2071,7 +2071,7 @@
           <a:p>
             <a:fld id="{8241CE7E-0F34-401D-A57E-323A74DBF7F2}" type="datetimeFigureOut">
               <a:rPr lang="en-US" smtClean="0"/>
-              <a:t>6/29/2022</a:t>
+              <a:t>6/30/2022</a:t>
             </a:fld>
             <a:endParaRPr lang="en-US"/>
           </a:p>
@@ -2382,7 +2382,7 @@
           <a:p>
             <a:fld id="{8241CE7E-0F34-401D-A57E-323A74DBF7F2}" type="datetimeFigureOut">
               <a:rPr lang="en-US" smtClean="0"/>
-              <a:t>6/29/2022</a:t>
+              <a:t>6/30/2022</a:t>
             </a:fld>
             <a:endParaRPr lang="en-US"/>
           </a:p>
@@ -2670,7 +2670,7 @@
           <a:p>
             <a:fld id="{8241CE7E-0F34-401D-A57E-323A74DBF7F2}" type="datetimeFigureOut">
               <a:rPr lang="en-US" smtClean="0"/>
-              <a:t>6/29/2022</a:t>
+              <a:t>6/30/2022</a:t>
             </a:fld>
             <a:endParaRPr lang="en-US"/>
           </a:p>
@@ -2911,7 +2911,7 @@
           <a:p>
             <a:fld id="{8241CE7E-0F34-401D-A57E-323A74DBF7F2}" type="datetimeFigureOut">
               <a:rPr lang="en-US" smtClean="0"/>
-              <a:t>6/29/2022</a:t>
+              <a:t>6/30/2022</a:t>
             </a:fld>
             <a:endParaRPr lang="en-US"/>
           </a:p>
@@ -3612,7 +3612,12 @@
             <p:ph idx="1"/>
           </p:nvPr>
         </p:nvSpPr>
-        <p:spPr/>
+        <p:spPr>
+          <a:xfrm>
+            <a:off x="838200" y="1825624"/>
+            <a:ext cx="10515600" cy="5032375"/>
+          </a:xfrm>
+        </p:spPr>
         <p:txBody>
           <a:bodyPr>
             <a:normAutofit/>
@@ -3645,73 +3650,109 @@
             </a:r>
             <a:r>
               <a:rPr lang="en-US" dirty="0" err="1"/>
-              <a:t>besitzt</a:t>
+              <a:t>weist</a:t>
+            </a:r>
+            <a:r>
+              <a:rPr lang="en-US" dirty="0"/>
+              <a:t> </a:t>
+            </a:r>
+            <a:r>
+              <a:rPr lang="en-US" dirty="0" err="1"/>
+              <a:t>nur</a:t>
+            </a:r>
+            <a:r>
+              <a:rPr lang="en-US" dirty="0"/>
+              <a:t> </a:t>
+            </a:r>
+            <a:r>
+              <a:rPr lang="en-US" i="1" dirty="0"/>
+              <a:t>plausible </a:t>
+            </a:r>
+            <a:r>
+              <a:rPr lang="en-US" i="1" dirty="0" err="1"/>
+              <a:t>Werte</a:t>
             </a:r>
             <a:r>
               <a:rPr lang="en-US" i="1" dirty="0"/>
               <a:t> </a:t>
             </a:r>
             <a:r>
-              <a:rPr lang="de-DE" i="1" dirty="0"/>
-              <a:t>nur </a:t>
-            </a:r>
-            <a:r>
               <a:rPr lang="en-US" i="1" dirty="0" err="1"/>
-              <a:t>realistische</a:t>
+              <a:t>unter</a:t>
+            </a:r>
+            <a:r>
+              <a:rPr lang="en-US" i="1" dirty="0"/>
+              <a:t> dem </a:t>
+            </a:r>
+            <a:r>
+              <a:rPr lang="en-US" i="1" dirty="0" err="1"/>
+              <a:t>Schwellwert</a:t>
+            </a:r>
+            <a:r>
+              <a:rPr lang="en-US" i="1" dirty="0"/>
+              <a:t>, Not ok</a:t>
+            </a:r>
+            <a:r>
+              <a:rPr lang="en-US" dirty="0"/>
+              <a:t> = 0. (Sample 792)</a:t>
+            </a:r>
+          </a:p>
+          <a:p>
+            <a:r>
+              <a:rPr lang="en-US" dirty="0"/>
+              <a:t>All WHERE </a:t>
+            </a:r>
+            <a:r>
+              <a:rPr lang="en-US" i="1" dirty="0"/>
+              <a:t>threshold exceeded = 1 </a:t>
+            </a:r>
+            <a:r>
+              <a:rPr lang="en-US" b="1" dirty="0"/>
+              <a:t>UND</a:t>
             </a:r>
             <a:r>
               <a:rPr lang="en-US" i="1" dirty="0"/>
               <a:t> </a:t>
             </a:r>
             <a:r>
-              <a:rPr lang="en-US" i="1" dirty="0" err="1"/>
-              <a:t>Werte</a:t>
-            </a:r>
-            <a:r>
-              <a:rPr lang="en-US" i="1" dirty="0"/>
-              <a:t>,</a:t>
+              <a:rPr lang="en-US" dirty="0"/>
+              <a:t>SN1 und SN2 </a:t>
+            </a:r>
+            <a:r>
+              <a:rPr lang="en-US" dirty="0" err="1"/>
+              <a:t>über</a:t>
             </a:r>
             <a:r>
               <a:rPr lang="en-US" dirty="0"/>
               <a:t> </a:t>
             </a:r>
             <a:r>
-              <a:rPr lang="en-US" i="1" dirty="0"/>
-              <a:t>Not ok</a:t>
+              <a:rPr lang="en-US" dirty="0" err="1"/>
+              <a:t>einem</a:t>
             </a:r>
             <a:r>
               <a:rPr lang="en-US" dirty="0"/>
-              <a:t> = 0. (Sample 792)</a:t>
-            </a:r>
-          </a:p>
-          <a:p>
+              <a:t> </a:t>
+            </a:r>
+            <a:r>
+              <a:rPr lang="en-US" dirty="0" err="1"/>
+              <a:t>Schwellwert</a:t>
+            </a:r>
+            <a:r>
+              <a:rPr lang="ru-RU" dirty="0"/>
+              <a:t>*</a:t>
+            </a:r>
             <a:r>
               <a:rPr lang="en-US" dirty="0"/>
-              <a:t>All WHERE </a:t>
-            </a:r>
-            <a:r>
-              <a:rPr lang="en-US" i="1" dirty="0"/>
-              <a:t>threshold exceeded = 1 </a:t>
-            </a:r>
-            <a:r>
-              <a:rPr lang="en-US" b="1" dirty="0"/>
-              <a:t>UND</a:t>
-            </a:r>
-            <a:r>
-              <a:rPr lang="en-US" i="1" dirty="0"/>
               <a:t> </a:t>
             </a:r>
             <a:r>
+              <a:rPr lang="en-US" dirty="0" err="1"/>
+              <a:t>liegt</a:t>
+            </a:r>
+            <a:r>
               <a:rPr lang="en-US" dirty="0"/>
-              <a:t>SN1 und SN2 </a:t>
-            </a:r>
-            <a:r>
-              <a:rPr lang="en-US" dirty="0" err="1"/>
-              <a:t>besitzt</a:t>
-            </a:r>
-            <a:r>
-              <a:rPr lang="en-US" i="1" dirty="0"/>
-              <a:t> 1er, </a:t>
+              <a:t>. </a:t>
             </a:r>
             <a:br>
               <a:rPr lang="en-US" i="1" dirty="0"/>
@@ -3726,6 +3767,224 @@
             </a:r>
           </a:p>
           <a:p>
+            <a:endParaRPr lang="en-US" dirty="0"/>
+          </a:p>
+          <a:p>
+            <a:pPr lvl="1"/>
+            <a:r>
+              <a:rPr lang="en-US" dirty="0"/>
+              <a:t>=&gt; </a:t>
+            </a:r>
+            <a:r>
+              <a:rPr lang="en-US" dirty="0" err="1"/>
+              <a:t>Wenn</a:t>
+            </a:r>
+            <a:r>
+              <a:rPr lang="en-US" dirty="0"/>
+              <a:t> </a:t>
+            </a:r>
+            <a:r>
+              <a:rPr lang="en-US" dirty="0" err="1"/>
+              <a:t>mindestens</a:t>
+            </a:r>
+            <a:r>
+              <a:rPr lang="en-US" dirty="0"/>
+              <a:t> </a:t>
+            </a:r>
+            <a:r>
+              <a:rPr lang="en-US" dirty="0" err="1"/>
+              <a:t>ein</a:t>
+            </a:r>
+            <a:r>
+              <a:rPr lang="en-US" dirty="0"/>
+              <a:t> </a:t>
+            </a:r>
+            <a:r>
+              <a:rPr lang="en-US" dirty="0" err="1"/>
+              <a:t>Signalwert</a:t>
+            </a:r>
+            <a:r>
+              <a:rPr lang="en-US" dirty="0"/>
+              <a:t> </a:t>
+            </a:r>
+            <a:r>
+              <a:rPr lang="de-DE" dirty="0"/>
+              <a:t>über einem Schwellwert</a:t>
+            </a:r>
+            <a:r>
+              <a:rPr lang="ru-RU" dirty="0"/>
+              <a:t>*</a:t>
+            </a:r>
+            <a:r>
+              <a:rPr lang="de-DE" dirty="0"/>
+              <a:t> liegt, wird die Schweißnaht</a:t>
+            </a:r>
+            <a:r>
+              <a:rPr lang="en-US" dirty="0"/>
+              <a:t> </a:t>
+            </a:r>
+            <a:r>
+              <a:rPr lang="en-US" dirty="0" err="1"/>
+              <a:t>zur</a:t>
+            </a:r>
+            <a:r>
+              <a:rPr lang="en-US" dirty="0"/>
+              <a:t> </a:t>
+            </a:r>
+            <a:r>
+              <a:rPr lang="en-US" dirty="0" err="1"/>
+              <a:t>Klasse</a:t>
+            </a:r>
+            <a:r>
+              <a:rPr lang="en-US" dirty="0"/>
+              <a:t> </a:t>
+            </a:r>
+            <a:r>
+              <a:rPr lang="en-US" i="1" dirty="0"/>
+              <a:t>Out of threshold </a:t>
+            </a:r>
+            <a:r>
+              <a:rPr lang="en-US" dirty="0" err="1"/>
+              <a:t>klassifiziert</a:t>
+            </a:r>
+            <a:r>
+              <a:rPr lang="en-US" dirty="0"/>
+              <a:t> und </a:t>
+            </a:r>
+            <a:r>
+              <a:rPr lang="en-US" dirty="0" err="1"/>
+              <a:t>zwar</a:t>
+            </a:r>
+            <a:r>
+              <a:rPr lang="en-US" dirty="0"/>
+              <a:t> egal </a:t>
+            </a:r>
+            <a:r>
+              <a:rPr lang="en-US" dirty="0" err="1"/>
+              <a:t>vom</a:t>
+            </a:r>
+            <a:r>
+              <a:rPr lang="en-US" dirty="0"/>
+              <a:t> </a:t>
+            </a:r>
+            <a:r>
+              <a:rPr lang="en-US" dirty="0" err="1"/>
+              <a:t>welchen</a:t>
+            </a:r>
+            <a:r>
+              <a:rPr lang="en-US" dirty="0"/>
+              <a:t> Sensor, </a:t>
+            </a:r>
+            <a:r>
+              <a:rPr lang="en-US" dirty="0" err="1"/>
+              <a:t>sprich</a:t>
+            </a:r>
+            <a:r>
+              <a:rPr lang="en-US" dirty="0"/>
+              <a:t> </a:t>
+            </a:r>
+            <a:r>
+              <a:rPr lang="en-US" i="1" dirty="0"/>
+              <a:t>OK </a:t>
+            </a:r>
+            <a:r>
+              <a:rPr lang="en-US" dirty="0" err="1"/>
+              <a:t>oder</a:t>
+            </a:r>
+            <a:r>
+              <a:rPr lang="en-US" i="1" dirty="0"/>
+              <a:t> Not Ok </a:t>
+            </a:r>
+            <a:r>
+              <a:rPr lang="en-US" dirty="0" err="1"/>
+              <a:t>wird</a:t>
+            </a:r>
+            <a:r>
+              <a:rPr lang="en-US" dirty="0"/>
+              <a:t> gar </a:t>
+            </a:r>
+            <a:r>
+              <a:rPr lang="en-US" dirty="0" err="1"/>
+              <a:t>nicht</a:t>
+            </a:r>
+            <a:r>
+              <a:rPr lang="en-US" dirty="0"/>
+              <a:t> </a:t>
+            </a:r>
+            <a:r>
+              <a:rPr lang="en-US" dirty="0" err="1"/>
+              <a:t>weiter</a:t>
+            </a:r>
+            <a:r>
+              <a:rPr lang="en-US" dirty="0"/>
+              <a:t> </a:t>
+            </a:r>
+            <a:r>
+              <a:rPr lang="en-US" dirty="0" err="1"/>
+              <a:t>betrachtet</a:t>
+            </a:r>
+            <a:r>
+              <a:rPr lang="en-US" dirty="0"/>
+              <a:t>. </a:t>
+            </a:r>
+          </a:p>
+          <a:p>
+            <a:pPr lvl="3">
+              <a:buFont typeface="Symbol" panose="05050102010706020507" pitchFamily="18" charset="2"/>
+              <a:buChar char="Þ"/>
+            </a:pPr>
+            <a:r>
+              <a:rPr lang="de-DE" dirty="0"/>
+              <a:t>es wird eher 1 Klassifizierungsmodell gebraucht mit 3 möglichen Outputs.</a:t>
+            </a:r>
+            <a:endParaRPr lang="ru-RU" dirty="0"/>
+          </a:p>
+          <a:p>
+            <a:pPr marL="1828800" lvl="4" indent="0">
+              <a:buNone/>
+            </a:pPr>
+            <a:r>
+              <a:rPr lang="ru-RU" dirty="0"/>
+              <a:t>			</a:t>
+            </a:r>
+            <a:endParaRPr lang="en-US" dirty="0"/>
+          </a:p>
+          <a:p>
+            <a:pPr marL="0" indent="0">
+              <a:buNone/>
+            </a:pPr>
+            <a:r>
+              <a:rPr lang="ru-RU" dirty="0"/>
+              <a:t>						</a:t>
+            </a:r>
+            <a:r>
+              <a:rPr lang="en-US" dirty="0"/>
+              <a:t>		</a:t>
+            </a:r>
+            <a:r>
+              <a:rPr lang="ru-RU" sz="1800" dirty="0"/>
+              <a:t>*</a:t>
+            </a:r>
+            <a:r>
+              <a:rPr lang="en-US" sz="1800" dirty="0" err="1"/>
+              <a:t>kann</a:t>
+            </a:r>
+            <a:r>
+              <a:rPr lang="en-US" sz="1800" dirty="0"/>
+              <a:t> 1 sein, muss </a:t>
+            </a:r>
+            <a:r>
+              <a:rPr lang="en-US" sz="1800" dirty="0" err="1"/>
+              <a:t>aber</a:t>
+            </a:r>
+            <a:r>
+              <a:rPr lang="en-US" sz="1800" dirty="0"/>
+              <a:t> </a:t>
+            </a:r>
+            <a:r>
+              <a:rPr lang="en-US" sz="1800" dirty="0" err="1"/>
+              <a:t>nicht</a:t>
+            </a:r>
             <a:endParaRPr lang="en-US" dirty="0"/>
           </a:p>
         </p:txBody>

</xml_diff>